<commit_message>
Fix: SDOT2015 presentation and article
</commit_message>
<xml_diff>
--- a/src/main/doc/papers/sdot2015.pptx
+++ b/src/main/doc/papers/sdot2015.pptx
@@ -214,7 +214,7 @@
           <a:p>
             <a:fld id="{D0AA1769-DD2B-594B-860D-8BE1E76F7C98}" type="datetimeFigureOut">
               <a:rPr lang="en-US" smtClean="0"/>
-              <a:t>18/11/15</a:t>
+              <a:t>19/11/15</a:t>
             </a:fld>
             <a:endParaRPr lang="en-US"/>
           </a:p>
@@ -2162,7 +2162,7 @@
             <a:fld id="{23A271A1-F6D6-438B-A432-4747EE7ECD40}" type="datetimeFigureOut">
               <a:rPr lang="en-US" smtClean="0"/>
               <a:pPr algn="ctr" eaLnBrk="1" latinLnBrk="0" hangingPunct="1"/>
-              <a:t>17/11/15</a:t>
+              <a:t>19/11/15</a:t>
             </a:fld>
             <a:endParaRPr lang="en-US" sz="2000" dirty="0">
               <a:solidFill>
@@ -2369,7 +2369,7 @@
             <a:fld id="{23A271A1-F6D6-438B-A432-4747EE7ECD40}" type="datetimeFigureOut">
               <a:rPr lang="en-US" smtClean="0"/>
               <a:pPr eaLnBrk="1" latinLnBrk="0" hangingPunct="1"/>
-              <a:t>17/11/15</a:t>
+              <a:t>19/11/15</a:t>
             </a:fld>
             <a:endParaRPr lang="en-US"/>
           </a:p>
@@ -2557,7 +2557,7 @@
             <a:fld id="{23A271A1-F6D6-438B-A432-4747EE7ECD40}" type="datetimeFigureOut">
               <a:rPr lang="en-US" smtClean="0"/>
               <a:pPr eaLnBrk="1" latinLnBrk="0" hangingPunct="1"/>
-              <a:t>17/11/15</a:t>
+              <a:t>19/11/15</a:t>
             </a:fld>
             <a:endParaRPr lang="en-US" dirty="0"/>
           </a:p>
@@ -2823,7 +2823,7 @@
             <a:fld id="{23A271A1-F6D6-438B-A432-4747EE7ECD40}" type="datetimeFigureOut">
               <a:rPr lang="en-US" smtClean="0"/>
               <a:pPr eaLnBrk="1" latinLnBrk="0" hangingPunct="1"/>
-              <a:t>17/11/15</a:t>
+              <a:t>19/11/15</a:t>
             </a:fld>
             <a:endParaRPr lang="en-US" dirty="0"/>
           </a:p>
@@ -3246,7 +3246,7 @@
             <a:fld id="{23A271A1-F6D6-438B-A432-4747EE7ECD40}" type="datetimeFigureOut">
               <a:rPr lang="en-US" smtClean="0"/>
               <a:pPr eaLnBrk="1" latinLnBrk="0" hangingPunct="1"/>
-              <a:t>17/11/15</a:t>
+              <a:t>19/11/15</a:t>
             </a:fld>
             <a:endParaRPr lang="en-US"/>
           </a:p>
@@ -3496,7 +3496,7 @@
             <a:fld id="{23A271A1-F6D6-438B-A432-4747EE7ECD40}" type="datetimeFigureOut">
               <a:rPr lang="en-US" smtClean="0"/>
               <a:pPr eaLnBrk="1" latinLnBrk="0" hangingPunct="1"/>
-              <a:t>17/11/15</a:t>
+              <a:t>19/11/15</a:t>
             </a:fld>
             <a:endParaRPr lang="en-US"/>
           </a:p>
@@ -3736,7 +3736,7 @@
             <a:fld id="{23A271A1-F6D6-438B-A432-4747EE7ECD40}" type="datetimeFigureOut">
               <a:rPr lang="en-US" smtClean="0"/>
               <a:pPr eaLnBrk="1" latinLnBrk="0" hangingPunct="1"/>
-              <a:t>17/11/15</a:t>
+              <a:t>19/11/15</a:t>
             </a:fld>
             <a:endParaRPr lang="en-US"/>
           </a:p>
@@ -3935,7 +3935,7 @@
             <a:fld id="{23A271A1-F6D6-438B-A432-4747EE7ECD40}" type="datetimeFigureOut">
               <a:rPr lang="en-US" smtClean="0"/>
               <a:pPr eaLnBrk="1" latinLnBrk="0" hangingPunct="1"/>
-              <a:t>17/11/15</a:t>
+              <a:t>19/11/15</a:t>
             </a:fld>
             <a:endParaRPr lang="en-US"/>
           </a:p>
@@ -4040,7 +4040,7 @@
             <a:fld id="{23A271A1-F6D6-438B-A432-4747EE7ECD40}" type="datetimeFigureOut">
               <a:rPr lang="en-US" smtClean="0"/>
               <a:pPr eaLnBrk="1" latinLnBrk="0" hangingPunct="1"/>
-              <a:t>17/11/15</a:t>
+              <a:t>19/11/15</a:t>
             </a:fld>
             <a:endParaRPr lang="en-US"/>
           </a:p>
@@ -4183,7 +4183,7 @@
             <a:fld id="{23A271A1-F6D6-438B-A432-4747EE7ECD40}" type="datetimeFigureOut">
               <a:rPr lang="en-US" smtClean="0"/>
               <a:pPr eaLnBrk="1" latinLnBrk="0" hangingPunct="1"/>
-              <a:t>17/11/15</a:t>
+              <a:t>19/11/15</a:t>
             </a:fld>
             <a:endParaRPr lang="en-US"/>
           </a:p>
@@ -4708,7 +4708,7 @@
             <a:fld id="{23A271A1-F6D6-438B-A432-4747EE7ECD40}" type="datetimeFigureOut">
               <a:rPr lang="en-US" smtClean="0"/>
               <a:pPr eaLnBrk="1" latinLnBrk="0" hangingPunct="1"/>
-              <a:t>17/11/15</a:t>
+              <a:t>19/11/15</a:t>
             </a:fld>
             <a:endParaRPr lang="en-US"/>
           </a:p>
@@ -4973,7 +4973,7 @@
             <a:fld id="{23A271A1-F6D6-438B-A432-4747EE7ECD40}" type="datetimeFigureOut">
               <a:rPr lang="en-US" smtClean="0"/>
               <a:pPr eaLnBrk="1" latinLnBrk="0" hangingPunct="1"/>
-              <a:t>17/11/15</a:t>
+              <a:t>19/11/15</a:t>
             </a:fld>
             <a:endParaRPr lang="en-US" sz="1400" dirty="0">
               <a:solidFill>
@@ -5597,11 +5597,7 @@
           <a:p>
             <a:r>
               <a:rPr lang="en-US" sz="2400" dirty="0" smtClean="0"/>
-              <a:t>Zbyněk </a:t>
-            </a:r>
-            <a:r>
-              <a:rPr lang="en-US" sz="2400" dirty="0" smtClean="0"/>
-              <a:t>Šlajchrt</a:t>
+              <a:t>Zbyněk Šlajchrt</a:t>
             </a:r>
             <a:endParaRPr lang="en-US" sz="2400" dirty="0"/>
           </a:p>
@@ -6591,6 +6587,27 @@
             </a:r>
           </a:p>
           <a:p>
+            <a:r>
+              <a:rPr lang="en-US" dirty="0" smtClean="0">
+                <a:latin typeface="Consolas"/>
+                <a:cs typeface="Consolas"/>
+              </a:rPr>
+              <a:t>/</a:t>
+            </a:r>
+            <a:r>
+              <a:rPr lang="en-US" dirty="0">
+                <a:latin typeface="Consolas"/>
+                <a:cs typeface="Consolas"/>
+              </a:rPr>
+              <a:t>/ </a:t>
+            </a:r>
+            <a:r>
+              <a:rPr lang="en-US" dirty="0" smtClean="0">
+                <a:latin typeface="Consolas"/>
+                <a:cs typeface="Consolas"/>
+              </a:rPr>
+              <a:t>Emotions2D is Emotions1D “squared”</a:t>
+            </a:r>
             <a:endParaRPr lang="en-US" dirty="0" smtClean="0">
               <a:latin typeface="Consolas"/>
               <a:cs typeface="Consolas"/>
@@ -6630,11 +6647,29 @@
                 <a:latin typeface="Consolas"/>
                 <a:cs typeface="Consolas"/>
               </a:rPr>
-              <a:t>BasicEmotions1D</a:t>
-            </a:r>
-          </a:p>
-          <a:p>
-            <a:endParaRPr lang="en-US" b="1" dirty="0" smtClean="0">
+              <a:t>Emotions1D</a:t>
+            </a:r>
+            <a:endParaRPr lang="en-US" dirty="0" smtClean="0">
+              <a:latin typeface="Consolas"/>
+              <a:cs typeface="Consolas"/>
+            </a:endParaRPr>
+          </a:p>
+          <a:p>
+            <a:r>
+              <a:rPr lang="en-US" dirty="0" smtClean="0">
+                <a:latin typeface="Consolas"/>
+                <a:cs typeface="Consolas"/>
+              </a:rPr>
+              <a:t>// Accompany Emotions2D by additional traits to complete </a:t>
+            </a:r>
+            <a:r>
+              <a:rPr lang="en-US" dirty="0" err="1" smtClean="0">
+                <a:latin typeface="Consolas"/>
+                <a:cs typeface="Consolas"/>
+              </a:rPr>
+              <a:t>deps</a:t>
+            </a:r>
+            <a:endParaRPr lang="en-US" dirty="0" smtClean="0">
               <a:latin typeface="Consolas"/>
               <a:cs typeface="Consolas"/>
             </a:endParaRPr>
@@ -7833,7 +7868,7 @@
         <p:spPr>
           <a:xfrm>
             <a:off x="612648" y="1532811"/>
-            <a:ext cx="7860392" cy="4801315"/>
+            <a:ext cx="7860392" cy="5078314"/>
           </a:xfrm>
           <a:prstGeom prst="rect">
             <a:avLst/>
@@ -8140,7 +8175,28 @@
                 <a:latin typeface="Consolas"/>
                 <a:cs typeface="Consolas"/>
               </a:rPr>
-              <a:t> Muscle(Line("m0", (136f, 144f), (140f, 140f)))</a:t>
+              <a:t> </a:t>
+            </a:r>
+            <a:r>
+              <a:rPr lang="en-US" dirty="0" err="1" smtClean="0">
+                <a:latin typeface="Consolas"/>
+                <a:cs typeface="Consolas"/>
+              </a:rPr>
+              <a:t>MuscleData</a:t>
+            </a:r>
+            <a:r>
+              <a:rPr lang="en-US" dirty="0" smtClean="0">
+                <a:latin typeface="Consolas"/>
+                <a:cs typeface="Consolas"/>
+              </a:rPr>
+              <a:t>(Line</a:t>
+            </a:r>
+            <a:r>
+              <a:rPr lang="en-US" dirty="0">
+                <a:latin typeface="Consolas"/>
+                <a:cs typeface="Consolas"/>
+              </a:rPr>
+              <a:t>("m0", (136f, 144f), (140f, 140f)))</a:t>
             </a:r>
           </a:p>
           <a:p>

</xml_diff>